<commit_message>
Nahrání aktualizované verze prezentace
</commit_message>
<xml_diff>
--- a/Prezentace/Logos polytechnikos.pptx
+++ b/Prezentace/Logos polytechnikos.pptx
@@ -5,7 +5,7 @@
     <p:sldMasterId id="2147483660" r:id="rId1"/>
   </p:sldMasterIdLst>
   <p:notesMasterIdLst>
-    <p:notesMasterId r:id="rId17"/>
+    <p:notesMasterId r:id="rId20"/>
   </p:notesMasterIdLst>
   <p:sldIdLst>
     <p:sldId id="256" r:id="rId2"/>
@@ -22,7 +22,10 @@
     <p:sldId id="268" r:id="rId13"/>
     <p:sldId id="269" r:id="rId14"/>
     <p:sldId id="270" r:id="rId15"/>
-    <p:sldId id="271" r:id="rId16"/>
+    <p:sldId id="275" r:id="rId16"/>
+    <p:sldId id="272" r:id="rId17"/>
+    <p:sldId id="273" r:id="rId18"/>
+    <p:sldId id="274" r:id="rId19"/>
   </p:sldIdLst>
   <p:sldSz cx="12192000" cy="6858000"/>
   <p:notesSz cx="6858000" cy="9144000"/>
@@ -215,7 +218,7 @@
           <a:p>
             <a:fld id="{7AC7D5AA-3C92-4085-A2E0-6B7666A4DDA1}" type="datetimeFigureOut">
               <a:rPr lang="cs-CZ" smtClean="0"/>
-              <a:t>20.11.2017</a:t>
+              <a:t>17.12.2017</a:t>
             </a:fld>
             <a:endParaRPr lang="cs-CZ"/>
           </a:p>
@@ -976,7 +979,259 @@
     </p:spTree>
     <p:extLst>
       <p:ext uri="{BB962C8B-B14F-4D97-AF65-F5344CB8AC3E}">
-        <p14:creationId xmlns:p14="http://schemas.microsoft.com/office/powerpoint/2010/main" val="3803248366"/>
+        <p14:creationId xmlns:p14="http://schemas.microsoft.com/office/powerpoint/2010/main" val="3191967772"/>
+      </p:ext>
+    </p:extLst>
+  </p:cSld>
+  <p:clrMapOvr>
+    <a:masterClrMapping/>
+  </p:clrMapOvr>
+</p:notes>
+</file>
+
+<file path=ppt/notesSlides/notesSlide15.xml><?xml version="1.0" encoding="utf-8"?>
+<p:notes xmlns:a="http://schemas.openxmlformats.org/drawingml/2006/main" xmlns:r="http://schemas.openxmlformats.org/officeDocument/2006/relationships" xmlns:p="http://schemas.openxmlformats.org/presentationml/2006/main">
+  <p:cSld>
+    <p:spTree>
+      <p:nvGrpSpPr>
+        <p:cNvPr id="1" name=""/>
+        <p:cNvGrpSpPr/>
+        <p:nvPr/>
+      </p:nvGrpSpPr>
+      <p:grpSpPr>
+        <a:xfrm>
+          <a:off x="0" y="0"/>
+          <a:ext cx="0" cy="0"/>
+          <a:chOff x="0" y="0"/>
+          <a:chExt cx="0" cy="0"/>
+        </a:xfrm>
+      </p:grpSpPr>
+      <p:sp>
+        <p:nvSpPr>
+          <p:cNvPr id="2" name="Zástupný symbol pro obrázek snímku 1"/>
+          <p:cNvSpPr>
+            <a:spLocks noGrp="1" noRot="1" noChangeAspect="1"/>
+          </p:cNvSpPr>
+          <p:nvPr>
+            <p:ph type="sldImg"/>
+          </p:nvPr>
+        </p:nvSpPr>
+        <p:spPr/>
+      </p:sp>
+      <p:sp>
+        <p:nvSpPr>
+          <p:cNvPr id="3" name="Zástupný symbol pro poznámky 2"/>
+          <p:cNvSpPr>
+            <a:spLocks noGrp="1"/>
+          </p:cNvSpPr>
+          <p:nvPr>
+            <p:ph type="body" idx="1"/>
+          </p:nvPr>
+        </p:nvSpPr>
+        <p:spPr/>
+        <p:txBody>
+          <a:bodyPr/>
+          <a:lstStyle/>
+          <a:p>
+            <a:endParaRPr lang="cs-CZ" dirty="0"/>
+          </a:p>
+        </p:txBody>
+      </p:sp>
+      <p:sp>
+        <p:nvSpPr>
+          <p:cNvPr id="4" name="Zástupný symbol pro číslo snímku 3"/>
+          <p:cNvSpPr>
+            <a:spLocks noGrp="1"/>
+          </p:cNvSpPr>
+          <p:nvPr>
+            <p:ph type="sldNum" sz="quarter" idx="10"/>
+          </p:nvPr>
+        </p:nvSpPr>
+        <p:spPr/>
+        <p:txBody>
+          <a:bodyPr/>
+          <a:lstStyle/>
+          <a:p>
+            <a:fld id="{2AC50AF5-70D0-4D39-96A2-38BFD65B85DA}" type="slidenum">
+              <a:rPr lang="cs-CZ" smtClean="0"/>
+              <a:t>16</a:t>
+            </a:fld>
+            <a:endParaRPr lang="cs-CZ"/>
+          </a:p>
+        </p:txBody>
+      </p:sp>
+    </p:spTree>
+    <p:extLst>
+      <p:ext uri="{BB962C8B-B14F-4D97-AF65-F5344CB8AC3E}">
+        <p14:creationId xmlns:p14="http://schemas.microsoft.com/office/powerpoint/2010/main" val="3845770852"/>
+      </p:ext>
+    </p:extLst>
+  </p:cSld>
+  <p:clrMapOvr>
+    <a:masterClrMapping/>
+  </p:clrMapOvr>
+</p:notes>
+</file>
+
+<file path=ppt/notesSlides/notesSlide16.xml><?xml version="1.0" encoding="utf-8"?>
+<p:notes xmlns:a="http://schemas.openxmlformats.org/drawingml/2006/main" xmlns:r="http://schemas.openxmlformats.org/officeDocument/2006/relationships" xmlns:p="http://schemas.openxmlformats.org/presentationml/2006/main">
+  <p:cSld>
+    <p:spTree>
+      <p:nvGrpSpPr>
+        <p:cNvPr id="1" name=""/>
+        <p:cNvGrpSpPr/>
+        <p:nvPr/>
+      </p:nvGrpSpPr>
+      <p:grpSpPr>
+        <a:xfrm>
+          <a:off x="0" y="0"/>
+          <a:ext cx="0" cy="0"/>
+          <a:chOff x="0" y="0"/>
+          <a:chExt cx="0" cy="0"/>
+        </a:xfrm>
+      </p:grpSpPr>
+      <p:sp>
+        <p:nvSpPr>
+          <p:cNvPr id="2" name="Zástupný symbol pro obrázek snímku 1"/>
+          <p:cNvSpPr>
+            <a:spLocks noGrp="1" noRot="1" noChangeAspect="1"/>
+          </p:cNvSpPr>
+          <p:nvPr>
+            <p:ph type="sldImg"/>
+          </p:nvPr>
+        </p:nvSpPr>
+        <p:spPr/>
+      </p:sp>
+      <p:sp>
+        <p:nvSpPr>
+          <p:cNvPr id="3" name="Zástupný symbol pro poznámky 2"/>
+          <p:cNvSpPr>
+            <a:spLocks noGrp="1"/>
+          </p:cNvSpPr>
+          <p:nvPr>
+            <p:ph type="body" idx="1"/>
+          </p:nvPr>
+        </p:nvSpPr>
+        <p:spPr/>
+        <p:txBody>
+          <a:bodyPr/>
+          <a:lstStyle/>
+          <a:p>
+            <a:endParaRPr lang="cs-CZ" dirty="0"/>
+          </a:p>
+        </p:txBody>
+      </p:sp>
+      <p:sp>
+        <p:nvSpPr>
+          <p:cNvPr id="4" name="Zástupný symbol pro číslo snímku 3"/>
+          <p:cNvSpPr>
+            <a:spLocks noGrp="1"/>
+          </p:cNvSpPr>
+          <p:nvPr>
+            <p:ph type="sldNum" sz="quarter" idx="10"/>
+          </p:nvPr>
+        </p:nvSpPr>
+        <p:spPr/>
+        <p:txBody>
+          <a:bodyPr/>
+          <a:lstStyle/>
+          <a:p>
+            <a:fld id="{2AC50AF5-70D0-4D39-96A2-38BFD65B85DA}" type="slidenum">
+              <a:rPr lang="cs-CZ" smtClean="0"/>
+              <a:t>17</a:t>
+            </a:fld>
+            <a:endParaRPr lang="cs-CZ"/>
+          </a:p>
+        </p:txBody>
+      </p:sp>
+    </p:spTree>
+    <p:extLst>
+      <p:ext uri="{BB962C8B-B14F-4D97-AF65-F5344CB8AC3E}">
+        <p14:creationId xmlns:p14="http://schemas.microsoft.com/office/powerpoint/2010/main" val="2303278173"/>
+      </p:ext>
+    </p:extLst>
+  </p:cSld>
+  <p:clrMapOvr>
+    <a:masterClrMapping/>
+  </p:clrMapOvr>
+</p:notes>
+</file>
+
+<file path=ppt/notesSlides/notesSlide17.xml><?xml version="1.0" encoding="utf-8"?>
+<p:notes xmlns:a="http://schemas.openxmlformats.org/drawingml/2006/main" xmlns:r="http://schemas.openxmlformats.org/officeDocument/2006/relationships" xmlns:p="http://schemas.openxmlformats.org/presentationml/2006/main">
+  <p:cSld>
+    <p:spTree>
+      <p:nvGrpSpPr>
+        <p:cNvPr id="1" name=""/>
+        <p:cNvGrpSpPr/>
+        <p:nvPr/>
+      </p:nvGrpSpPr>
+      <p:grpSpPr>
+        <a:xfrm>
+          <a:off x="0" y="0"/>
+          <a:ext cx="0" cy="0"/>
+          <a:chOff x="0" y="0"/>
+          <a:chExt cx="0" cy="0"/>
+        </a:xfrm>
+      </p:grpSpPr>
+      <p:sp>
+        <p:nvSpPr>
+          <p:cNvPr id="2" name="Zástupný symbol pro obrázek snímku 1"/>
+          <p:cNvSpPr>
+            <a:spLocks noGrp="1" noRot="1" noChangeAspect="1"/>
+          </p:cNvSpPr>
+          <p:nvPr>
+            <p:ph type="sldImg"/>
+          </p:nvPr>
+        </p:nvSpPr>
+        <p:spPr/>
+      </p:sp>
+      <p:sp>
+        <p:nvSpPr>
+          <p:cNvPr id="3" name="Zástupný symbol pro poznámky 2"/>
+          <p:cNvSpPr>
+            <a:spLocks noGrp="1"/>
+          </p:cNvSpPr>
+          <p:nvPr>
+            <p:ph type="body" idx="1"/>
+          </p:nvPr>
+        </p:nvSpPr>
+        <p:spPr/>
+        <p:txBody>
+          <a:bodyPr/>
+          <a:lstStyle/>
+          <a:p>
+            <a:endParaRPr lang="cs-CZ" dirty="0"/>
+          </a:p>
+        </p:txBody>
+      </p:sp>
+      <p:sp>
+        <p:nvSpPr>
+          <p:cNvPr id="4" name="Zástupný symbol pro číslo snímku 3"/>
+          <p:cNvSpPr>
+            <a:spLocks noGrp="1"/>
+          </p:cNvSpPr>
+          <p:nvPr>
+            <p:ph type="sldNum" sz="quarter" idx="10"/>
+          </p:nvPr>
+        </p:nvSpPr>
+        <p:spPr/>
+        <p:txBody>
+          <a:bodyPr/>
+          <a:lstStyle/>
+          <a:p>
+            <a:fld id="{2AC50AF5-70D0-4D39-96A2-38BFD65B85DA}" type="slidenum">
+              <a:rPr lang="cs-CZ" smtClean="0"/>
+              <a:t>18</a:t>
+            </a:fld>
+            <a:endParaRPr lang="cs-CZ"/>
+          </a:p>
+        </p:txBody>
+      </p:sp>
+    </p:spTree>
+    <p:extLst>
+      <p:ext uri="{BB962C8B-B14F-4D97-AF65-F5344CB8AC3E}">
+        <p14:creationId xmlns:p14="http://schemas.microsoft.com/office/powerpoint/2010/main" val="3246438418"/>
       </p:ext>
     </p:extLst>
   </p:cSld>
@@ -1849,7 +2104,7 @@
           <a:p>
             <a:fld id="{0D7E35CE-007C-4423-AF2A-D3D2B2222A99}" type="datetimeFigureOut">
               <a:rPr lang="cs-CZ" smtClean="0"/>
-              <a:t>20.11.2017</a:t>
+              <a:t>17.12.2017</a:t>
             </a:fld>
             <a:endParaRPr lang="cs-CZ"/>
           </a:p>
@@ -2285,7 +2540,7 @@
           <a:p>
             <a:fld id="{0D7E35CE-007C-4423-AF2A-D3D2B2222A99}" type="datetimeFigureOut">
               <a:rPr lang="cs-CZ" smtClean="0"/>
-              <a:t>20.11.2017</a:t>
+              <a:t>17.12.2017</a:t>
             </a:fld>
             <a:endParaRPr lang="cs-CZ"/>
           </a:p>
@@ -2535,7 +2790,7 @@
           <a:p>
             <a:fld id="{0D7E35CE-007C-4423-AF2A-D3D2B2222A99}" type="datetimeFigureOut">
               <a:rPr lang="cs-CZ" smtClean="0"/>
-              <a:t>20.11.2017</a:t>
+              <a:t>17.12.2017</a:t>
             </a:fld>
             <a:endParaRPr lang="cs-CZ"/>
           </a:p>
@@ -2843,7 +3098,7 @@
           <a:p>
             <a:fld id="{0D7E35CE-007C-4423-AF2A-D3D2B2222A99}" type="datetimeFigureOut">
               <a:rPr lang="cs-CZ" smtClean="0"/>
-              <a:t>20.11.2017</a:t>
+              <a:t>17.12.2017</a:t>
             </a:fld>
             <a:endParaRPr lang="cs-CZ"/>
           </a:p>
@@ -3161,7 +3416,7 @@
           <a:p>
             <a:fld id="{0D7E35CE-007C-4423-AF2A-D3D2B2222A99}" type="datetimeFigureOut">
               <a:rPr lang="cs-CZ" smtClean="0"/>
-              <a:t>20.11.2017</a:t>
+              <a:t>17.12.2017</a:t>
             </a:fld>
             <a:endParaRPr lang="cs-CZ"/>
           </a:p>
@@ -3463,7 +3718,7 @@
           <a:p>
             <a:fld id="{0D7E35CE-007C-4423-AF2A-D3D2B2222A99}" type="datetimeFigureOut">
               <a:rPr lang="cs-CZ" smtClean="0"/>
-              <a:t>20.11.2017</a:t>
+              <a:t>17.12.2017</a:t>
             </a:fld>
             <a:endParaRPr lang="cs-CZ"/>
           </a:p>
@@ -3830,7 +4085,7 @@
           <a:p>
             <a:fld id="{0D7E35CE-007C-4423-AF2A-D3D2B2222A99}" type="datetimeFigureOut">
               <a:rPr lang="cs-CZ" smtClean="0"/>
-              <a:t>20.11.2017</a:t>
+              <a:t>17.12.2017</a:t>
             </a:fld>
             <a:endParaRPr lang="cs-CZ"/>
           </a:p>
@@ -4004,7 +4259,7 @@
           <a:p>
             <a:fld id="{0D7E35CE-007C-4423-AF2A-D3D2B2222A99}" type="datetimeFigureOut">
               <a:rPr lang="cs-CZ" smtClean="0"/>
-              <a:t>20.11.2017</a:t>
+              <a:t>17.12.2017</a:t>
             </a:fld>
             <a:endParaRPr lang="cs-CZ"/>
           </a:p>
@@ -4184,7 +4439,7 @@
           <a:p>
             <a:fld id="{0D7E35CE-007C-4423-AF2A-D3D2B2222A99}" type="datetimeFigureOut">
               <a:rPr lang="cs-CZ" smtClean="0"/>
-              <a:t>20.11.2017</a:t>
+              <a:t>17.12.2017</a:t>
             </a:fld>
             <a:endParaRPr lang="cs-CZ"/>
           </a:p>
@@ -4354,7 +4609,7 @@
           <a:p>
             <a:fld id="{0D7E35CE-007C-4423-AF2A-D3D2B2222A99}" type="datetimeFigureOut">
               <a:rPr lang="cs-CZ" smtClean="0"/>
-              <a:t>20.11.2017</a:t>
+              <a:t>17.12.2017</a:t>
             </a:fld>
             <a:endParaRPr lang="cs-CZ"/>
           </a:p>
@@ -4604,7 +4859,7 @@
           <a:p>
             <a:fld id="{0D7E35CE-007C-4423-AF2A-D3D2B2222A99}" type="datetimeFigureOut">
               <a:rPr lang="cs-CZ" smtClean="0"/>
-              <a:t>20.11.2017</a:t>
+              <a:t>17.12.2017</a:t>
             </a:fld>
             <a:endParaRPr lang="cs-CZ"/>
           </a:p>
@@ -4840,7 +5095,7 @@
           <a:p>
             <a:fld id="{0D7E35CE-007C-4423-AF2A-D3D2B2222A99}" type="datetimeFigureOut">
               <a:rPr lang="cs-CZ" smtClean="0"/>
-              <a:t>20.11.2017</a:t>
+              <a:t>17.12.2017</a:t>
             </a:fld>
             <a:endParaRPr lang="cs-CZ"/>
           </a:p>
@@ -5222,7 +5477,7 @@
           <a:p>
             <a:fld id="{0D7E35CE-007C-4423-AF2A-D3D2B2222A99}" type="datetimeFigureOut">
               <a:rPr lang="cs-CZ" smtClean="0"/>
-              <a:t>20.11.2017</a:t>
+              <a:t>17.12.2017</a:t>
             </a:fld>
             <a:endParaRPr lang="cs-CZ"/>
           </a:p>
@@ -5340,7 +5595,7 @@
           <a:p>
             <a:fld id="{0D7E35CE-007C-4423-AF2A-D3D2B2222A99}" type="datetimeFigureOut">
               <a:rPr lang="cs-CZ" smtClean="0"/>
-              <a:t>20.11.2017</a:t>
+              <a:t>17.12.2017</a:t>
             </a:fld>
             <a:endParaRPr lang="cs-CZ"/>
           </a:p>
@@ -5435,7 +5690,7 @@
           <a:p>
             <a:fld id="{0D7E35CE-007C-4423-AF2A-D3D2B2222A99}" type="datetimeFigureOut">
               <a:rPr lang="cs-CZ" smtClean="0"/>
-              <a:t>20.11.2017</a:t>
+              <a:t>17.12.2017</a:t>
             </a:fld>
             <a:endParaRPr lang="cs-CZ"/>
           </a:p>
@@ -5690,7 +5945,7 @@
           <a:p>
             <a:fld id="{0D7E35CE-007C-4423-AF2A-D3D2B2222A99}" type="datetimeFigureOut">
               <a:rPr lang="cs-CZ" smtClean="0"/>
-              <a:t>20.11.2017</a:t>
+              <a:t>17.12.2017</a:t>
             </a:fld>
             <a:endParaRPr lang="cs-CZ"/>
           </a:p>
@@ -5973,7 +6228,7 @@
           <a:p>
             <a:fld id="{0D7E35CE-007C-4423-AF2A-D3D2B2222A99}" type="datetimeFigureOut">
               <a:rPr lang="cs-CZ" smtClean="0"/>
-              <a:t>20.11.2017</a:t>
+              <a:t>17.12.2017</a:t>
             </a:fld>
             <a:endParaRPr lang="cs-CZ"/>
           </a:p>
@@ -6379,7 +6634,7 @@
           <a:p>
             <a:fld id="{0D7E35CE-007C-4423-AF2A-D3D2B2222A99}" type="datetimeFigureOut">
               <a:rPr lang="cs-CZ" smtClean="0"/>
-              <a:t>20.11.2017</a:t>
+              <a:t>17.12.2017</a:t>
             </a:fld>
             <a:endParaRPr lang="cs-CZ"/>
           </a:p>
@@ -7937,7 +8192,7 @@
           <a:p>
             <a:r>
               <a:rPr lang="cs-CZ" dirty="0"/>
-              <a:t>Závěr</a:t>
+              <a:t>Novinky</a:t>
             </a:r>
           </a:p>
         </p:txBody>
@@ -7960,8 +8215,8 @@
         </p:nvSpPr>
         <p:spPr>
           <a:xfrm>
-            <a:off x="124375" y="860971"/>
-            <a:ext cx="9292341" cy="5026482"/>
+            <a:off x="124375" y="905359"/>
+            <a:ext cx="9472386" cy="1988761"/>
           </a:xfrm>
         </p:spPr>
         <p:txBody>
@@ -7972,38 +8227,14 @@
           <a:p>
             <a:r>
               <a:rPr lang="cs-CZ" dirty="0"/>
-              <a:t>Projekt</a:t>
-            </a:r>
-          </a:p>
-          <a:p>
-            <a:endParaRPr lang="cs-CZ" dirty="0"/>
+              <a:t>Zprovoznění funkce pro zapamatování si uživatele a obnovu hesla. </a:t>
+            </a:r>
           </a:p>
           <a:p>
             <a:r>
               <a:rPr lang="cs-CZ" dirty="0"/>
-              <a:t>Práce v týmu</a:t>
-            </a:r>
-          </a:p>
-          <a:p>
-            <a:endParaRPr lang="cs-CZ" dirty="0"/>
-          </a:p>
-          <a:p>
-            <a:r>
-              <a:rPr lang="cs-CZ" dirty="0"/>
-              <a:t>SCRUM?</a:t>
-            </a:r>
-          </a:p>
-          <a:p>
-            <a:endParaRPr lang="cs-CZ" dirty="0"/>
-          </a:p>
-          <a:p>
-            <a:endParaRPr lang="cs-CZ" dirty="0"/>
-          </a:p>
-          <a:p>
-            <a:endParaRPr lang="cs-CZ" dirty="0"/>
-          </a:p>
-          <a:p>
-            <a:endParaRPr lang="cs-CZ" dirty="0"/>
+              <a:t>Oprava některých chyb.</a:t>
+            </a:r>
           </a:p>
           <a:p>
             <a:endParaRPr lang="cs-CZ" dirty="0"/>
@@ -8016,7 +8247,508 @@
     </p:spTree>
     <p:extLst>
       <p:ext uri="{BB962C8B-B14F-4D97-AF65-F5344CB8AC3E}">
-        <p14:creationId xmlns:p14="http://schemas.microsoft.com/office/powerpoint/2010/main" val="3468477724"/>
+        <p14:creationId xmlns:p14="http://schemas.microsoft.com/office/powerpoint/2010/main" val="3203521836"/>
+      </p:ext>
+    </p:extLst>
+  </p:cSld>
+  <p:clrMapOvr>
+    <a:masterClrMapping/>
+  </p:clrMapOvr>
+</p:sld>
+</file>
+
+<file path=ppt/slides/slide16.xml><?xml version="1.0" encoding="utf-8"?>
+<p:sld xmlns:a="http://schemas.openxmlformats.org/drawingml/2006/main" xmlns:r="http://schemas.openxmlformats.org/officeDocument/2006/relationships" xmlns:p="http://schemas.openxmlformats.org/presentationml/2006/main">
+  <p:cSld>
+    <p:spTree>
+      <p:nvGrpSpPr>
+        <p:cNvPr id="1" name=""/>
+        <p:cNvGrpSpPr/>
+        <p:nvPr/>
+      </p:nvGrpSpPr>
+      <p:grpSpPr>
+        <a:xfrm>
+          <a:off x="0" y="0"/>
+          <a:ext cx="0" cy="0"/>
+          <a:chOff x="0" y="0"/>
+          <a:chExt cx="0" cy="0"/>
+        </a:xfrm>
+      </p:grpSpPr>
+      <p:sp>
+        <p:nvSpPr>
+          <p:cNvPr id="2" name="Nadpis 1">
+            <a:extLst>
+              <a:ext uri="{FF2B5EF4-FFF2-40B4-BE49-F238E27FC236}">
+                <a16:creationId xmlns:a16="http://schemas.microsoft.com/office/drawing/2014/main" id="{994241AF-F280-419F-A426-B17C2D98FC4B}"/>
+              </a:ext>
+            </a:extLst>
+          </p:cNvPr>
+          <p:cNvSpPr>
+            <a:spLocks noGrp="1"/>
+          </p:cNvSpPr>
+          <p:nvPr>
+            <p:ph type="title"/>
+          </p:nvPr>
+        </p:nvSpPr>
+        <p:spPr>
+          <a:xfrm>
+            <a:off x="124375" y="191287"/>
+            <a:ext cx="10218110" cy="629816"/>
+          </a:xfrm>
+        </p:spPr>
+        <p:txBody>
+          <a:bodyPr>
+            <a:normAutofit fontScale="90000"/>
+          </a:bodyPr>
+          <a:lstStyle/>
+          <a:p>
+            <a:r>
+              <a:rPr lang="cs-CZ" dirty="0"/>
+              <a:t>Retrospektiva</a:t>
+            </a:r>
+          </a:p>
+        </p:txBody>
+      </p:sp>
+      <p:sp>
+        <p:nvSpPr>
+          <p:cNvPr id="5" name="Zástupný symbol pro obsah 4">
+            <a:extLst>
+              <a:ext uri="{FF2B5EF4-FFF2-40B4-BE49-F238E27FC236}">
+                <a16:creationId xmlns:a16="http://schemas.microsoft.com/office/drawing/2014/main" id="{162B40DF-5C2C-46A5-B241-0CD69A560E19}"/>
+              </a:ext>
+            </a:extLst>
+          </p:cNvPr>
+          <p:cNvSpPr>
+            <a:spLocks noGrp="1"/>
+          </p:cNvSpPr>
+          <p:nvPr>
+            <p:ph idx="1"/>
+          </p:nvPr>
+        </p:nvSpPr>
+        <p:spPr>
+          <a:xfrm>
+            <a:off x="124375" y="905359"/>
+            <a:ext cx="6329691" cy="5575340"/>
+          </a:xfrm>
+        </p:spPr>
+        <p:txBody>
+          <a:bodyPr>
+            <a:normAutofit/>
+          </a:bodyPr>
+          <a:lstStyle/>
+          <a:p>
+            <a:r>
+              <a:rPr lang="cs-CZ" dirty="0"/>
+              <a:t>User </a:t>
+            </a:r>
+            <a:r>
+              <a:rPr lang="cs-CZ" dirty="0" err="1"/>
+              <a:t>Bundle</a:t>
+            </a:r>
+            <a:endParaRPr lang="cs-CZ" dirty="0"/>
+          </a:p>
+          <a:p>
+            <a:pPr lvl="1"/>
+            <a:r>
+              <a:rPr lang="cs-CZ" dirty="0" err="1"/>
+              <a:t>Symfony</a:t>
+            </a:r>
+            <a:r>
+              <a:rPr lang="cs-CZ" dirty="0"/>
+              <a:t> balík pro správu uživatelů</a:t>
+            </a:r>
+          </a:p>
+          <a:p>
+            <a:pPr lvl="1"/>
+            <a:r>
+              <a:rPr lang="cs-CZ" dirty="0"/>
+              <a:t>Obsahuje veškerou funkcionalitu pro správu uživatelů</a:t>
+            </a:r>
+          </a:p>
+          <a:p>
+            <a:r>
+              <a:rPr lang="cs-CZ" dirty="0"/>
+              <a:t>Šablona SB-admin-2</a:t>
+            </a:r>
+          </a:p>
+          <a:p>
+            <a:pPr lvl="1"/>
+            <a:r>
+              <a:rPr lang="cs-CZ" dirty="0"/>
+              <a:t>Rozložení stránky</a:t>
+            </a:r>
+          </a:p>
+          <a:p>
+            <a:pPr lvl="1"/>
+            <a:r>
+              <a:rPr lang="cs-CZ" dirty="0"/>
+              <a:t>Absence nutnosti navrhovat vzhled od ‚píky‘</a:t>
+            </a:r>
+          </a:p>
+          <a:p>
+            <a:r>
+              <a:rPr lang="cs-CZ" dirty="0" err="1"/>
+              <a:t>Symfony</a:t>
+            </a:r>
+            <a:r>
+              <a:rPr lang="cs-CZ" dirty="0"/>
+              <a:t> dokumentace</a:t>
+            </a:r>
+          </a:p>
+          <a:p>
+            <a:pPr lvl="1"/>
+            <a:r>
+              <a:rPr lang="cs-CZ" dirty="0"/>
+              <a:t>Mnoho cenných informací</a:t>
+            </a:r>
+          </a:p>
+          <a:p>
+            <a:pPr lvl="1"/>
+            <a:r>
+              <a:rPr lang="cs-CZ" dirty="0"/>
+              <a:t>Jedna z nejpřehlednějších dokumentací se kterou jsem měl zkušenost se setkat</a:t>
+            </a:r>
+          </a:p>
+          <a:p>
+            <a:pPr lvl="1"/>
+            <a:endParaRPr lang="cs-CZ" dirty="0"/>
+          </a:p>
+          <a:p>
+            <a:endParaRPr lang="cs-CZ" dirty="0"/>
+          </a:p>
+          <a:p>
+            <a:endParaRPr lang="cs-CZ" dirty="0"/>
+          </a:p>
+        </p:txBody>
+      </p:sp>
+      <p:pic>
+        <p:nvPicPr>
+          <p:cNvPr id="6" name="Obrázek 5">
+            <a:extLst>
+              <a:ext uri="{FF2B5EF4-FFF2-40B4-BE49-F238E27FC236}">
+                <a16:creationId xmlns:a16="http://schemas.microsoft.com/office/drawing/2014/main" id="{3DE80B8B-C705-493A-9CAA-3CFF05AA131D}"/>
+              </a:ext>
+            </a:extLst>
+          </p:cNvPr>
+          <p:cNvPicPr>
+            <a:picLocks noChangeAspect="1"/>
+          </p:cNvPicPr>
+          <p:nvPr/>
+        </p:nvPicPr>
+        <p:blipFill>
+          <a:blip r:embed="rId3"/>
+          <a:stretch>
+            <a:fillRect/>
+          </a:stretch>
+        </p:blipFill>
+        <p:spPr>
+          <a:xfrm>
+            <a:off x="6461421" y="3610046"/>
+            <a:ext cx="5606204" cy="3126841"/>
+          </a:xfrm>
+          <a:prstGeom prst="rect">
+            <a:avLst/>
+          </a:prstGeom>
+        </p:spPr>
+      </p:pic>
+    </p:spTree>
+    <p:extLst>
+      <p:ext uri="{BB962C8B-B14F-4D97-AF65-F5344CB8AC3E}">
+        <p14:creationId xmlns:p14="http://schemas.microsoft.com/office/powerpoint/2010/main" val="2203115841"/>
+      </p:ext>
+    </p:extLst>
+  </p:cSld>
+  <p:clrMapOvr>
+    <a:masterClrMapping/>
+  </p:clrMapOvr>
+</p:sld>
+</file>
+
+<file path=ppt/slides/slide17.xml><?xml version="1.0" encoding="utf-8"?>
+<p:sld xmlns:a="http://schemas.openxmlformats.org/drawingml/2006/main" xmlns:r="http://schemas.openxmlformats.org/officeDocument/2006/relationships" xmlns:p="http://schemas.openxmlformats.org/presentationml/2006/main">
+  <p:cSld>
+    <p:spTree>
+      <p:nvGrpSpPr>
+        <p:cNvPr id="1" name=""/>
+        <p:cNvGrpSpPr/>
+        <p:nvPr/>
+      </p:nvGrpSpPr>
+      <p:grpSpPr>
+        <a:xfrm>
+          <a:off x="0" y="0"/>
+          <a:ext cx="0" cy="0"/>
+          <a:chOff x="0" y="0"/>
+          <a:chExt cx="0" cy="0"/>
+        </a:xfrm>
+      </p:grpSpPr>
+      <p:sp>
+        <p:nvSpPr>
+          <p:cNvPr id="2" name="Nadpis 1">
+            <a:extLst>
+              <a:ext uri="{FF2B5EF4-FFF2-40B4-BE49-F238E27FC236}">
+                <a16:creationId xmlns:a16="http://schemas.microsoft.com/office/drawing/2014/main" id="{994241AF-F280-419F-A426-B17C2D98FC4B}"/>
+              </a:ext>
+            </a:extLst>
+          </p:cNvPr>
+          <p:cNvSpPr>
+            <a:spLocks noGrp="1"/>
+          </p:cNvSpPr>
+          <p:nvPr>
+            <p:ph type="title"/>
+          </p:nvPr>
+        </p:nvSpPr>
+        <p:spPr>
+          <a:xfrm>
+            <a:off x="124375" y="191287"/>
+            <a:ext cx="10218110" cy="629816"/>
+          </a:xfrm>
+        </p:spPr>
+        <p:txBody>
+          <a:bodyPr>
+            <a:normAutofit fontScale="90000"/>
+          </a:bodyPr>
+          <a:lstStyle/>
+          <a:p>
+            <a:r>
+              <a:rPr lang="cs-CZ" dirty="0"/>
+              <a:t>Tým</a:t>
+            </a:r>
+          </a:p>
+        </p:txBody>
+      </p:sp>
+      <p:sp>
+        <p:nvSpPr>
+          <p:cNvPr id="5" name="Zástupný symbol pro obsah 4">
+            <a:extLst>
+              <a:ext uri="{FF2B5EF4-FFF2-40B4-BE49-F238E27FC236}">
+                <a16:creationId xmlns:a16="http://schemas.microsoft.com/office/drawing/2014/main" id="{162B40DF-5C2C-46A5-B241-0CD69A560E19}"/>
+              </a:ext>
+            </a:extLst>
+          </p:cNvPr>
+          <p:cNvSpPr>
+            <a:spLocks noGrp="1"/>
+          </p:cNvSpPr>
+          <p:nvPr>
+            <p:ph idx="1"/>
+          </p:nvPr>
+        </p:nvSpPr>
+        <p:spPr>
+          <a:xfrm>
+            <a:off x="124375" y="905358"/>
+            <a:ext cx="9292341" cy="5229112"/>
+          </a:xfrm>
+        </p:spPr>
+        <p:txBody>
+          <a:bodyPr>
+            <a:normAutofit/>
+          </a:bodyPr>
+          <a:lstStyle/>
+          <a:p>
+            <a:r>
+              <a:rPr lang="cs-CZ" dirty="0"/>
+              <a:t>Menší tým</a:t>
+            </a:r>
+          </a:p>
+          <a:p>
+            <a:pPr marL="0" indent="0">
+              <a:buNone/>
+            </a:pPr>
+            <a:endParaRPr lang="cs-CZ" dirty="0"/>
+          </a:p>
+          <a:p>
+            <a:r>
+              <a:rPr lang="cs-CZ" dirty="0"/>
+              <a:t>Klady: </a:t>
+            </a:r>
+          </a:p>
+          <a:p>
+            <a:pPr lvl="1"/>
+            <a:r>
+              <a:rPr lang="cs-CZ" dirty="0"/>
+              <a:t>Méně kreativity, méně práce</a:t>
+            </a:r>
+          </a:p>
+          <a:p>
+            <a:pPr lvl="1"/>
+            <a:r>
+              <a:rPr lang="cs-CZ" dirty="0"/>
+              <a:t>Lepší domluva</a:t>
+            </a:r>
+          </a:p>
+          <a:p>
+            <a:pPr lvl="1"/>
+            <a:r>
+              <a:rPr lang="cs-CZ" dirty="0"/>
+              <a:t>Snazší rozložení úkolů</a:t>
+            </a:r>
+          </a:p>
+          <a:p>
+            <a:r>
+              <a:rPr lang="cs-CZ" dirty="0"/>
+              <a:t>Zápory</a:t>
+            </a:r>
+          </a:p>
+          <a:p>
+            <a:pPr lvl="1"/>
+            <a:r>
+              <a:rPr lang="cs-CZ" dirty="0"/>
+              <a:t>Absence </a:t>
+            </a:r>
+            <a:r>
+              <a:rPr lang="cs-CZ" dirty="0" err="1"/>
+              <a:t>symofny</a:t>
+            </a:r>
+            <a:r>
+              <a:rPr lang="cs-CZ" dirty="0"/>
+              <a:t> programátorů</a:t>
+            </a:r>
+          </a:p>
+          <a:p>
+            <a:pPr lvl="1"/>
+            <a:r>
+              <a:rPr lang="cs-CZ" dirty="0"/>
+              <a:t>Více práce pro zmíněnou minoritu</a:t>
+            </a:r>
+          </a:p>
+          <a:p>
+            <a:endParaRPr lang="cs-CZ" dirty="0"/>
+          </a:p>
+          <a:p>
+            <a:endParaRPr lang="cs-CZ" dirty="0"/>
+          </a:p>
+          <a:p>
+            <a:endParaRPr lang="cs-CZ" dirty="0"/>
+          </a:p>
+        </p:txBody>
+      </p:sp>
+    </p:spTree>
+    <p:extLst>
+      <p:ext uri="{BB962C8B-B14F-4D97-AF65-F5344CB8AC3E}">
+        <p14:creationId xmlns:p14="http://schemas.microsoft.com/office/powerpoint/2010/main" val="2686409081"/>
+      </p:ext>
+    </p:extLst>
+  </p:cSld>
+  <p:clrMapOvr>
+    <a:masterClrMapping/>
+  </p:clrMapOvr>
+</p:sld>
+</file>
+
+<file path=ppt/slides/slide18.xml><?xml version="1.0" encoding="utf-8"?>
+<p:sld xmlns:a="http://schemas.openxmlformats.org/drawingml/2006/main" xmlns:r="http://schemas.openxmlformats.org/officeDocument/2006/relationships" xmlns:p="http://schemas.openxmlformats.org/presentationml/2006/main">
+  <p:cSld>
+    <p:spTree>
+      <p:nvGrpSpPr>
+        <p:cNvPr id="1" name=""/>
+        <p:cNvGrpSpPr/>
+        <p:nvPr/>
+      </p:nvGrpSpPr>
+      <p:grpSpPr>
+        <a:xfrm>
+          <a:off x="0" y="0"/>
+          <a:ext cx="0" cy="0"/>
+          <a:chOff x="0" y="0"/>
+          <a:chExt cx="0" cy="0"/>
+        </a:xfrm>
+      </p:grpSpPr>
+      <p:sp>
+        <p:nvSpPr>
+          <p:cNvPr id="2" name="Nadpis 1">
+            <a:extLst>
+              <a:ext uri="{FF2B5EF4-FFF2-40B4-BE49-F238E27FC236}">
+                <a16:creationId xmlns:a16="http://schemas.microsoft.com/office/drawing/2014/main" id="{994241AF-F280-419F-A426-B17C2D98FC4B}"/>
+              </a:ext>
+            </a:extLst>
+          </p:cNvPr>
+          <p:cNvSpPr>
+            <a:spLocks noGrp="1"/>
+          </p:cNvSpPr>
+          <p:nvPr>
+            <p:ph type="title"/>
+          </p:nvPr>
+        </p:nvSpPr>
+        <p:spPr>
+          <a:xfrm>
+            <a:off x="124375" y="191287"/>
+            <a:ext cx="10218110" cy="629816"/>
+          </a:xfrm>
+        </p:spPr>
+        <p:txBody>
+          <a:bodyPr>
+            <a:normAutofit fontScale="90000"/>
+          </a:bodyPr>
+          <a:lstStyle/>
+          <a:p>
+            <a:r>
+              <a:rPr lang="cs-CZ" dirty="0"/>
+              <a:t>Závěr</a:t>
+            </a:r>
+          </a:p>
+        </p:txBody>
+      </p:sp>
+      <p:sp>
+        <p:nvSpPr>
+          <p:cNvPr id="5" name="Zástupný symbol pro obsah 4">
+            <a:extLst>
+              <a:ext uri="{FF2B5EF4-FFF2-40B4-BE49-F238E27FC236}">
+                <a16:creationId xmlns:a16="http://schemas.microsoft.com/office/drawing/2014/main" id="{162B40DF-5C2C-46A5-B241-0CD69A560E19}"/>
+              </a:ext>
+            </a:extLst>
+          </p:cNvPr>
+          <p:cNvSpPr>
+            <a:spLocks noGrp="1"/>
+          </p:cNvSpPr>
+          <p:nvPr>
+            <p:ph idx="1"/>
+          </p:nvPr>
+        </p:nvSpPr>
+        <p:spPr>
+          <a:xfrm>
+            <a:off x="124375" y="905358"/>
+            <a:ext cx="9292341" cy="3125103"/>
+          </a:xfrm>
+        </p:spPr>
+        <p:txBody>
+          <a:bodyPr>
+            <a:normAutofit/>
+          </a:bodyPr>
+          <a:lstStyle/>
+          <a:p>
+            <a:r>
+              <a:rPr lang="cs-CZ" dirty="0"/>
+              <a:t>Projekt je úspěšně dokončen</a:t>
+            </a:r>
+          </a:p>
+          <a:p>
+            <a:r>
+              <a:rPr lang="cs-CZ" dirty="0"/>
+              <a:t>Probíhající testy neobjevily žádné chyby</a:t>
+            </a:r>
+          </a:p>
+          <a:p>
+            <a:endParaRPr lang="cs-CZ" dirty="0"/>
+          </a:p>
+          <a:p>
+            <a:r>
+              <a:rPr lang="cs-CZ" dirty="0"/>
+              <a:t>Cenné zkušenosti před započetí práce na bakalářské práci</a:t>
+            </a:r>
+          </a:p>
+          <a:p>
+            <a:endParaRPr lang="cs-CZ" dirty="0"/>
+          </a:p>
+          <a:p>
+            <a:endParaRPr lang="cs-CZ" dirty="0"/>
+          </a:p>
+          <a:p>
+            <a:endParaRPr lang="cs-CZ" dirty="0"/>
+          </a:p>
+        </p:txBody>
+      </p:sp>
+    </p:spTree>
+    <p:extLst>
+      <p:ext uri="{BB962C8B-B14F-4D97-AF65-F5344CB8AC3E}">
+        <p14:creationId xmlns:p14="http://schemas.microsoft.com/office/powerpoint/2010/main" val="1453652923"/>
       </p:ext>
     </p:extLst>
   </p:cSld>

</xml_diff>